<commit_message>
add sect 2.1 slides
</commit_message>
<xml_diff>
--- a/135/projects/project3_HareTortoiseCompetition.pptx
+++ b/135/projects/project3_HareTortoiseCompetition.pptx
@@ -4329,63 +4329,9 @@
             </a:r>
             <a:r>
               <a:rPr lang="en-US" sz="2200" dirty="0">
-                <a:solidFill>
-                  <a:srgbClr val="000000"/>
-                </a:solidFill>
-                <a:highlight>
-                  <a:srgbClr val="E8F2FE"/>
-                </a:highlight>
                 <a:latin typeface="Monaco" charset="0"/>
               </a:rPr>
-              <a:t>String </a:t>
-            </a:r>
-            <a:r>
-              <a:rPr lang="en-US" sz="2200" dirty="0" err="1">
-                <a:solidFill>
-                  <a:srgbClr val="6A3E3E"/>
-                </a:solidFill>
-                <a:highlight>
-                  <a:srgbClr val="E8F2FE"/>
-                </a:highlight>
-                <a:latin typeface="Monaco" charset="0"/>
-              </a:rPr>
-              <a:t>str</a:t>
-            </a:r>
-            <a:r>
-              <a:rPr lang="en-US" sz="2200" dirty="0">
-                <a:solidFill>
-                  <a:srgbClr val="000000"/>
-                </a:solidFill>
-                <a:highlight>
-                  <a:srgbClr val="E8F2FE"/>
-                </a:highlight>
-                <a:latin typeface="Monaco" charset="0"/>
-              </a:rPr>
-              <a:t> = </a:t>
-            </a:r>
-            <a:r>
-              <a:rPr lang="en-US" sz="2200" dirty="0">
-                <a:solidFill>
-                  <a:srgbClr val="2A00FF"/>
-                </a:solidFill>
-                <a:highlight>
-                  <a:srgbClr val="E8F2FE"/>
-                </a:highlight>
-                <a:latin typeface="Monaco" charset="0"/>
-              </a:rPr>
-              <a:t>""</a:t>
-            </a:r>
-            <a:r>
-              <a:rPr lang="en-US" sz="2200" dirty="0">
-                <a:solidFill>
-                  <a:srgbClr val="000000"/>
-                </a:solidFill>
-                <a:highlight>
-                  <a:srgbClr val="E8F2FE"/>
-                </a:highlight>
-                <a:latin typeface="Monaco" charset="0"/>
-              </a:rPr>
-              <a:t>;</a:t>
+              <a:t>string str = "";</a:t>
             </a:r>
             <a:r>
               <a:rPr lang="en-US" sz="2800" dirty="0"/>

</xml_diff>